<commit_message>
Added Nbuilder example and some presentation updates
</commit_message>
<xml_diff>
--- a/Presentation.pptx
+++ b/Presentation.pptx
@@ -5245,6 +5245,17 @@
               <a:rPr lang="en-AU" dirty="0" smtClean="0"/>
               <a:t>…</a:t>
             </a:r>
+          </a:p>
+          <a:p>
+            <a:endParaRPr lang="en-AU" dirty="0"/>
+          </a:p>
+          <a:p>
+            <a:r>
+              <a:rPr lang="en-AU" dirty="0">
+                <a:hlinkClick r:id="rId2"/>
+              </a:rPr>
+              <a:t>https://github.com/robdmoore/TestFixtureDataGenerationPresentation</a:t>
+            </a:r>
             <a:endParaRPr lang="en-AU" dirty="0"/>
           </a:p>
         </p:txBody>
@@ -5620,9 +5631,6 @@
               <a:rPr lang="en-AU" b="1" dirty="0" smtClean="0"/>
               <a:t>Lack of clarity</a:t>
             </a:r>
-          </a:p>
-          <a:p>
-            <a:endParaRPr lang="en-AU" dirty="0"/>
           </a:p>
         </p:txBody>
       </p:sp>
@@ -6701,14 +6709,14 @@
 <file path=customXml/itemProps3.xml><?xml version="1.0" encoding="utf-8"?>
 <ds:datastoreItem xmlns:ds="http://schemas.openxmlformats.org/officeDocument/2006/customXml" ds:itemID="{A1799C11-A99F-41A4-B4EE-4CEC9408E056}">
   <ds:schemaRefs>
+    <ds:schemaRef ds:uri="http://purl.org/dc/dcmitype/"/>
+    <ds:schemaRef ds:uri="http://schemas.microsoft.com/office/2006/documentManagement/types"/>
+    <ds:schemaRef ds:uri="http://schemas.microsoft.com/office/2006/metadata/properties"/>
+    <ds:schemaRef ds:uri="http://www.w3.org/XML/1998/namespace"/>
+    <ds:schemaRef ds:uri="http://schemas.openxmlformats.org/package/2006/metadata/core-properties"/>
     <ds:schemaRef ds:uri="http://purl.org/dc/elements/1.1/"/>
-    <ds:schemaRef ds:uri="http://purl.org/dc/dcmitype/"/>
-    <ds:schemaRef ds:uri="http://schemas.microsoft.com/office/2006/metadata/properties"/>
-    <ds:schemaRef ds:uri="http://schemas.microsoft.com/office/2006/documentManagement/types"/>
-    <ds:schemaRef ds:uri="http://www.w3.org/XML/1998/namespace"/>
+    <ds:schemaRef ds:uri="http://schemas.microsoft.com/office/infopath/2007/PartnerControls"/>
     <ds:schemaRef ds:uri="http://purl.org/dc/terms/"/>
-    <ds:schemaRef ds:uri="http://schemas.microsoft.com/office/infopath/2007/PartnerControls"/>
-    <ds:schemaRef ds:uri="http://schemas.openxmlformats.org/package/2006/metadata/core-properties"/>
   </ds:schemaRefs>
 </ds:datastoreItem>
 </file>
</xml_diff>

<commit_message>
Presso and code updates
</commit_message>
<xml_diff>
--- a/Presentation.pptx
+++ b/Presentation.pptx
@@ -5,16 +5,18 @@
     <p:sldMasterId id="2147483648" r:id="rId4"/>
   </p:sldMasterIdLst>
   <p:notesMasterIdLst>
-    <p:notesMasterId r:id="rId9"/>
+    <p:notesMasterId r:id="rId11"/>
   </p:notesMasterIdLst>
   <p:handoutMasterIdLst>
-    <p:handoutMasterId r:id="rId10"/>
+    <p:handoutMasterId r:id="rId12"/>
   </p:handoutMasterIdLst>
   <p:sldIdLst>
     <p:sldId id="256" r:id="rId5"/>
     <p:sldId id="257" r:id="rId6"/>
     <p:sldId id="258" r:id="rId7"/>
     <p:sldId id="259" r:id="rId8"/>
+    <p:sldId id="260" r:id="rId9"/>
+    <p:sldId id="261" r:id="rId10"/>
   </p:sldIdLst>
   <p:sldSz cx="12192000" cy="6858000"/>
   <p:notesSz cx="6858000" cy="9144000"/>
@@ -5234,7 +5236,9 @@
         </p:nvSpPr>
         <p:spPr/>
         <p:txBody>
-          <a:bodyPr/>
+          <a:bodyPr>
+            <a:normAutofit lnSpcReduction="10000"/>
+          </a:bodyPr>
           <a:lstStyle/>
           <a:p>
             <a:r>
@@ -5254,7 +5258,22 @@
               <a:rPr lang="en-AU" dirty="0">
                 <a:hlinkClick r:id="rId2"/>
               </a:rPr>
-              <a:t>https://github.com/robdmoore/TestFixtureDataGenerationPresentation</a:t>
+              <a:t>https://</a:t>
+            </a:r>
+            <a:r>
+              <a:rPr lang="en-AU" dirty="0" smtClean="0">
+                <a:hlinkClick r:id="rId2"/>
+              </a:rPr>
+              <a:t>github.com/robdmoore/TestFixtureDataGenerationPresentation</a:t>
+            </a:r>
+            <a:endParaRPr lang="en-AU" dirty="0" smtClean="0"/>
+          </a:p>
+          <a:p>
+            <a:r>
+              <a:rPr lang="en-AU" dirty="0">
+                <a:hlinkClick r:id="rId3"/>
+              </a:rPr>
+              <a:t>http://robdmoore.id.au/blog/2013/05/26</a:t>
             </a:r>
             <a:endParaRPr lang="en-AU" dirty="0"/>
           </a:p>
@@ -5596,39 +5615,67 @@
           <a:lstStyle/>
           <a:p>
             <a:r>
-              <a:rPr lang="en-AU" dirty="0" smtClean="0"/>
+              <a:rPr lang="en-AU" dirty="0" smtClean="0">
+                <a:solidFill>
+                  <a:srgbClr val="C00000"/>
+                </a:solidFill>
+              </a:rPr>
               <a:t>Constructor refactoring is HARD</a:t>
             </a:r>
           </a:p>
           <a:p>
             <a:r>
-              <a:rPr lang="en-AU" dirty="0" smtClean="0"/>
+              <a:rPr lang="en-AU" dirty="0" smtClean="0">
+                <a:solidFill>
+                  <a:srgbClr val="C00000"/>
+                </a:solidFill>
+              </a:rPr>
               <a:t>Inter/intra-fixture repetition and inconsistency</a:t>
             </a:r>
           </a:p>
           <a:p>
             <a:r>
-              <a:rPr lang="en-AU" dirty="0" smtClean="0"/>
+              <a:rPr lang="en-AU" dirty="0" smtClean="0">
+                <a:solidFill>
+                  <a:srgbClr val="C00000"/>
+                </a:solidFill>
+              </a:rPr>
               <a:t>Verbose list building</a:t>
             </a:r>
           </a:p>
           <a:p>
             <a:r>
-              <a:rPr lang="en-AU" dirty="0" smtClean="0"/>
+              <a:rPr lang="en-AU" dirty="0" smtClean="0">
+                <a:solidFill>
+                  <a:srgbClr val="C00000"/>
+                </a:solidFill>
+              </a:rPr>
               <a:t>Can’t use </a:t>
             </a:r>
             <a:r>
-              <a:rPr lang="en-AU" dirty="0" err="1" smtClean="0"/>
+              <a:rPr lang="en-AU" dirty="0" err="1" smtClean="0">
+                <a:solidFill>
+                  <a:srgbClr val="C00000"/>
+                </a:solidFill>
+              </a:rPr>
               <a:t>NBuilder</a:t>
             </a:r>
             <a:r>
-              <a:rPr lang="en-AU" dirty="0" smtClean="0"/>
+              <a:rPr lang="en-AU" dirty="0" smtClean="0">
+                <a:solidFill>
+                  <a:srgbClr val="C00000"/>
+                </a:solidFill>
+              </a:rPr>
               <a:t> easily</a:t>
             </a:r>
           </a:p>
           <a:p>
             <a:r>
-              <a:rPr lang="en-AU" b="1" dirty="0" smtClean="0"/>
+              <a:rPr lang="en-AU" b="1" dirty="0" smtClean="0">
+                <a:solidFill>
+                  <a:srgbClr val="C00000"/>
+                </a:solidFill>
+              </a:rPr>
               <a:t>Lack of clarity</a:t>
             </a:r>
           </a:p>
@@ -5684,6 +5731,320 @@
     <p:extLst>
       <p:ext uri="{BB962C8B-B14F-4D97-AF65-F5344CB8AC3E}">
         <p14:creationId xmlns:p14="http://schemas.microsoft.com/office/powerpoint/2010/main" val="76878284"/>
+      </p:ext>
+    </p:extLst>
+  </p:cSld>
+  <p:clrMapOvr>
+    <a:masterClrMapping/>
+  </p:clrMapOvr>
+</p:sld>
+</file>
+
+<file path=ppt/slides/slide5.xml><?xml version="1.0" encoding="utf-8"?>
+<p:sld xmlns:a="http://schemas.openxmlformats.org/drawingml/2006/main" xmlns:r="http://schemas.openxmlformats.org/officeDocument/2006/relationships" xmlns:p="http://schemas.openxmlformats.org/presentationml/2006/main">
+  <p:cSld>
+    <p:spTree>
+      <p:nvGrpSpPr>
+        <p:cNvPr id="1" name=""/>
+        <p:cNvGrpSpPr/>
+        <p:nvPr/>
+      </p:nvGrpSpPr>
+      <p:grpSpPr>
+        <a:xfrm>
+          <a:off x="0" y="0"/>
+          <a:ext cx="0" cy="0"/>
+          <a:chOff x="0" y="0"/>
+          <a:chExt cx="0" cy="0"/>
+        </a:xfrm>
+      </p:grpSpPr>
+      <p:sp>
+        <p:nvSpPr>
+          <p:cNvPr id="2" name="Content Placeholder 1"/>
+          <p:cNvSpPr>
+            <a:spLocks noGrp="1"/>
+          </p:cNvSpPr>
+          <p:nvPr>
+            <p:ph idx="1"/>
+          </p:nvPr>
+        </p:nvSpPr>
+        <p:spPr/>
+        <p:txBody>
+          <a:bodyPr>
+            <a:normAutofit lnSpcReduction="10000"/>
+          </a:bodyPr>
+          <a:lstStyle/>
+          <a:p>
+            <a:r>
+              <a:rPr lang="en-AU" dirty="0" smtClean="0">
+                <a:solidFill>
+                  <a:schemeClr val="accent3">
+                    <a:lumMod val="50000"/>
+                  </a:schemeClr>
+                </a:solidFill>
+              </a:rPr>
+              <a:t>More readable</a:t>
+            </a:r>
+          </a:p>
+          <a:p>
+            <a:r>
+              <a:rPr lang="en-AU" dirty="0" smtClean="0">
+                <a:solidFill>
+                  <a:schemeClr val="accent3">
+                    <a:lumMod val="50000"/>
+                  </a:schemeClr>
+                </a:solidFill>
+              </a:rPr>
+              <a:t>More consistent</a:t>
+            </a:r>
+          </a:p>
+          <a:p>
+            <a:pPr marL="0" indent="0">
+              <a:buNone/>
+            </a:pPr>
+            <a:endParaRPr lang="en-AU" dirty="0" smtClean="0"/>
+          </a:p>
+          <a:p>
+            <a:r>
+              <a:rPr lang="en-AU" dirty="0" smtClean="0">
+                <a:solidFill>
+                  <a:srgbClr val="C00000"/>
+                </a:solidFill>
+              </a:rPr>
+              <a:t>Still lots of constructor calls</a:t>
+            </a:r>
+          </a:p>
+          <a:p>
+            <a:r>
+              <a:rPr lang="en-AU" dirty="0" smtClean="0">
+                <a:solidFill>
+                  <a:srgbClr val="C00000"/>
+                </a:solidFill>
+              </a:rPr>
+              <a:t>God object</a:t>
+            </a:r>
+          </a:p>
+          <a:p>
+            <a:r>
+              <a:rPr lang="en-AU" dirty="0" smtClean="0">
+                <a:solidFill>
+                  <a:srgbClr val="C00000"/>
+                </a:solidFill>
+              </a:rPr>
+              <a:t>Awkward for data-driven tests</a:t>
+            </a:r>
+            <a:endParaRPr lang="en-AU" dirty="0">
+              <a:solidFill>
+                <a:srgbClr val="C00000"/>
+              </a:solidFill>
+            </a:endParaRPr>
+          </a:p>
+        </p:txBody>
+      </p:sp>
+      <p:sp>
+        <p:nvSpPr>
+          <p:cNvPr id="3" name="Slide Number Placeholder 2"/>
+          <p:cNvSpPr>
+            <a:spLocks noGrp="1"/>
+          </p:cNvSpPr>
+          <p:nvPr>
+            <p:ph type="sldNum" sz="quarter" idx="12"/>
+          </p:nvPr>
+        </p:nvSpPr>
+        <p:spPr/>
+        <p:txBody>
+          <a:bodyPr/>
+          <a:lstStyle/>
+          <a:p>
+            <a:fld id="{60774F4A-1F38-48E5-8B8A-6E300AFFF9D4}" type="slidenum">
+              <a:rPr lang="en-AU" smtClean="0"/>
+              <a:t>5</a:t>
+            </a:fld>
+            <a:endParaRPr lang="en-AU"/>
+          </a:p>
+        </p:txBody>
+      </p:sp>
+      <p:sp>
+        <p:nvSpPr>
+          <p:cNvPr id="4" name="Title 3"/>
+          <p:cNvSpPr>
+            <a:spLocks noGrp="1"/>
+          </p:cNvSpPr>
+          <p:nvPr>
+            <p:ph type="title"/>
+          </p:nvPr>
+        </p:nvSpPr>
+        <p:spPr/>
+        <p:txBody>
+          <a:bodyPr/>
+          <a:lstStyle/>
+          <a:p>
+            <a:r>
+              <a:rPr lang="en-AU" dirty="0" smtClean="0"/>
+              <a:t>Enter Object Mother</a:t>
+            </a:r>
+            <a:endParaRPr lang="en-AU" dirty="0"/>
+          </a:p>
+        </p:txBody>
+      </p:sp>
+    </p:spTree>
+    <p:extLst>
+      <p:ext uri="{BB962C8B-B14F-4D97-AF65-F5344CB8AC3E}">
+        <p14:creationId xmlns:p14="http://schemas.microsoft.com/office/powerpoint/2010/main" val="3701442779"/>
+      </p:ext>
+    </p:extLst>
+  </p:cSld>
+  <p:clrMapOvr>
+    <a:masterClrMapping/>
+  </p:clrMapOvr>
+</p:sld>
+</file>
+
+<file path=ppt/slides/slide6.xml><?xml version="1.0" encoding="utf-8"?>
+<p:sld xmlns:a="http://schemas.openxmlformats.org/drawingml/2006/main" xmlns:r="http://schemas.openxmlformats.org/officeDocument/2006/relationships" xmlns:p="http://schemas.openxmlformats.org/presentationml/2006/main">
+  <p:cSld>
+    <p:spTree>
+      <p:nvGrpSpPr>
+        <p:cNvPr id="1" name=""/>
+        <p:cNvGrpSpPr/>
+        <p:nvPr/>
+      </p:nvGrpSpPr>
+      <p:grpSpPr>
+        <a:xfrm>
+          <a:off x="0" y="0"/>
+          <a:ext cx="0" cy="0"/>
+          <a:chOff x="0" y="0"/>
+          <a:chExt cx="0" cy="0"/>
+        </a:xfrm>
+      </p:grpSpPr>
+      <p:sp>
+        <p:nvSpPr>
+          <p:cNvPr id="2" name="Content Placeholder 1"/>
+          <p:cNvSpPr>
+            <a:spLocks noGrp="1"/>
+          </p:cNvSpPr>
+          <p:nvPr>
+            <p:ph idx="1"/>
+          </p:nvPr>
+        </p:nvSpPr>
+        <p:spPr/>
+        <p:txBody>
+          <a:bodyPr/>
+          <a:lstStyle/>
+          <a:p>
+            <a:r>
+              <a:rPr lang="en-AU" dirty="0" smtClean="0">
+                <a:solidFill>
+                  <a:schemeClr val="accent3">
+                    <a:lumMod val="50000"/>
+                  </a:schemeClr>
+                </a:solidFill>
+              </a:rPr>
+              <a:t>One constructor call</a:t>
+            </a:r>
+          </a:p>
+          <a:p>
+            <a:r>
+              <a:rPr lang="en-AU" dirty="0" smtClean="0">
+                <a:solidFill>
+                  <a:schemeClr val="accent3">
+                    <a:lumMod val="50000"/>
+                  </a:schemeClr>
+                </a:solidFill>
+              </a:rPr>
+              <a:t>Easy to write (fluent)</a:t>
+            </a:r>
+          </a:p>
+          <a:p>
+            <a:r>
+              <a:rPr lang="en-AU" dirty="0" smtClean="0">
+                <a:solidFill>
+                  <a:schemeClr val="accent3">
+                    <a:lumMod val="50000"/>
+                  </a:schemeClr>
+                </a:solidFill>
+              </a:rPr>
+              <a:t>Can express actions</a:t>
+            </a:r>
+          </a:p>
+          <a:p>
+            <a:r>
+              <a:rPr lang="en-AU" dirty="0" smtClean="0">
+                <a:solidFill>
+                  <a:schemeClr val="accent3">
+                    <a:lumMod val="50000"/>
+                  </a:schemeClr>
+                </a:solidFill>
+              </a:rPr>
+              <a:t>Forms documentation</a:t>
+            </a:r>
+          </a:p>
+          <a:p>
+            <a:r>
+              <a:rPr lang="en-AU" dirty="0" smtClean="0">
+                <a:solidFill>
+                  <a:schemeClr val="accent3">
+                    <a:lumMod val="50000"/>
+                  </a:schemeClr>
+                </a:solidFill>
+              </a:rPr>
+              <a:t>Reduced noise</a:t>
+            </a:r>
+          </a:p>
+          <a:p>
+            <a:endParaRPr lang="en-AU" dirty="0"/>
+          </a:p>
+        </p:txBody>
+      </p:sp>
+      <p:sp>
+        <p:nvSpPr>
+          <p:cNvPr id="3" name="Slide Number Placeholder 2"/>
+          <p:cNvSpPr>
+            <a:spLocks noGrp="1"/>
+          </p:cNvSpPr>
+          <p:nvPr>
+            <p:ph type="sldNum" sz="quarter" idx="12"/>
+          </p:nvPr>
+        </p:nvSpPr>
+        <p:spPr/>
+        <p:txBody>
+          <a:bodyPr/>
+          <a:lstStyle/>
+          <a:p>
+            <a:fld id="{60774F4A-1F38-48E5-8B8A-6E300AFFF9D4}" type="slidenum">
+              <a:rPr lang="en-AU" smtClean="0"/>
+              <a:t>6</a:t>
+            </a:fld>
+            <a:endParaRPr lang="en-AU"/>
+          </a:p>
+        </p:txBody>
+      </p:sp>
+      <p:sp>
+        <p:nvSpPr>
+          <p:cNvPr id="4" name="Title 3"/>
+          <p:cNvSpPr>
+            <a:spLocks noGrp="1"/>
+          </p:cNvSpPr>
+          <p:nvPr>
+            <p:ph type="title"/>
+          </p:nvPr>
+        </p:nvSpPr>
+        <p:spPr/>
+        <p:txBody>
+          <a:bodyPr/>
+          <a:lstStyle/>
+          <a:p>
+            <a:r>
+              <a:rPr lang="en-AU" dirty="0" smtClean="0"/>
+              <a:t>Test Data Builder Pattern to the rescue!</a:t>
+            </a:r>
+            <a:endParaRPr lang="en-AU" dirty="0"/>
+          </a:p>
+        </p:txBody>
+      </p:sp>
+    </p:spTree>
+    <p:extLst>
+      <p:ext uri="{BB962C8B-B14F-4D97-AF65-F5344CB8AC3E}">
+        <p14:creationId xmlns:p14="http://schemas.microsoft.com/office/powerpoint/2010/main" val="688008354"/>
       </p:ext>
     </p:extLst>
   </p:cSld>

</xml_diff>